<commit_message>
Add header guards to all headers and newline to end of files
</commit_message>
<xml_diff>
--- a/docs/Dino_Run_Presentation.pptx
+++ b/docs/Dino_Run_Presentation.pptx
@@ -5648,13 +5648,8 @@
             <a:pPr lvl="1"/>
             <a:r>
               <a:rPr lang="en-US" sz="1800" dirty="0"/>
-              <a:t>ARM9: Timers/Interrupts</a:t>
-            </a:r>
-            <a:r>
-              <a:rPr lang="en-US" sz="1800"/>
-              <a:t>, LCD TFT, A/up/left/right keys</a:t>
-            </a:r>
-            <a:endParaRPr lang="en-US" sz="1800" dirty="0"/>
+              <a:t>ARM9: Timers/Interrupts, LCD TFT, A/up/left/right keys</a:t>
+            </a:r>
           </a:p>
           <a:p>
             <a:pPr lvl="1"/>
@@ -5681,7 +5676,7 @@
             <a:pPr lvl="1"/>
             <a:r>
               <a:rPr lang="en-US" sz="1800" dirty="0"/>
-              <a:t>Collisions are tested more frequently(4 times a second), obstacles and items are introduced at regular intervals (5 and 11 seconds, and 6 seconds respectively)</a:t>
+              <a:t>Collisions are tested more frequently(12 times a second), the level graphics are updated(4 times a second),obstacles and items are introduced at regular intervals (5 and 11 seconds, and 6 seconds respectively)</a:t>
             </a:r>
             <a:endParaRPr lang="en-US" sz="1600" dirty="0"/>
           </a:p>

</xml_diff>